<commit_message>
changed dates and ensured same naming convention
</commit_message>
<xml_diff>
--- a/training/slides/ROS-I Basic Developers Training - Session 5(Hydro).pptx
+++ b/training/slides/ROS-I Basic Developers Training - Session 5(Hydro).pptx
@@ -206,7 +206,7 @@
             <a:fld id="{7CBAD3B9-CF90-4638-A87B-F1F739FB7DFD}" type="datetimeFigureOut">
               <a:rPr lang="en-US" smtClean="0"/>
               <a:pPr/>
-              <a:t>5/5/14</a:t>
+              <a:t>5/14/14</a:t>
             </a:fld>
             <a:endParaRPr lang="en-US" dirty="0"/>
           </a:p>
@@ -373,7 +373,7 @@
             <a:fld id="{81EF7E27-DD55-49D9-943B-4056DEC7F6AA}" type="datetimeFigureOut">
               <a:rPr lang="en-US" smtClean="0"/>
               <a:pPr/>
-              <a:t>5/5/14</a:t>
+              <a:t>5/14/14</a:t>
             </a:fld>
             <a:endParaRPr lang="en-US" dirty="0"/>
           </a:p>
@@ -1287,7 +1287,7 @@
             <a:fld id="{BAF8435A-9809-404D-86C5-82FB815D1380}" type="datetimeFigureOut">
               <a:rPr lang="en-US" smtClean="0"/>
               <a:pPr/>
-              <a:t>5/5/14</a:t>
+              <a:t>5/14/14</a:t>
             </a:fld>
             <a:endParaRPr lang="en-US"/>
           </a:p>
@@ -4592,7 +4592,7 @@
         <p:spPr>
           <a:xfrm>
             <a:off x="3805572" y="3810000"/>
-            <a:ext cx="1429498" cy="400110"/>
+            <a:ext cx="1223412" cy="400110"/>
           </a:xfrm>
           <a:prstGeom prst="rect">
             <a:avLst/>
@@ -4611,7 +4611,23 @@
                   <a:schemeClr val="tx2"/>
                 </a:solidFill>
               </a:rPr>
-              <a:t>June 5 2014</a:t>
+              <a:t>May</a:t>
+            </a:r>
+            <a:r>
+              <a:rPr lang="en-US" sz="2000" dirty="0" smtClean="0">
+                <a:solidFill>
+                  <a:schemeClr val="tx2"/>
+                </a:solidFill>
+              </a:rPr>
+              <a:t> </a:t>
+            </a:r>
+            <a:r>
+              <a:rPr lang="en-US" sz="2000" dirty="0" smtClean="0">
+                <a:solidFill>
+                  <a:schemeClr val="tx2"/>
+                </a:solidFill>
+              </a:rPr>
+              <a:t>2014</a:t>
             </a:r>
             <a:endParaRPr lang="en-US" sz="2000" dirty="0">
               <a:solidFill>
@@ -4638,11 +4654,7 @@
           <a:p>
             <a:r>
               <a:rPr lang="en-US" dirty="0" smtClean="0"/>
-              <a:t>5 June </a:t>
-            </a:r>
-            <a:r>
-              <a:rPr lang="en-US" dirty="0" smtClean="0"/>
-              <a:t>2014</a:t>
+              <a:t>May 2014</a:t>
             </a:r>
             <a:endParaRPr lang="en-US" dirty="0"/>
           </a:p>
@@ -4804,8 +4816,8 @@
           <a:lstStyle/>
           <a:p>
             <a:r>
-              <a:rPr lang="en-US" dirty="0"/>
-              <a:t>5 June 2014</a:t>
+              <a:rPr lang="en-US" dirty="0" smtClean="0"/>
+              <a:t>May 2014</a:t>
             </a:r>
             <a:endParaRPr lang="en-US" dirty="0"/>
           </a:p>
@@ -5097,8 +5109,8 @@
           <a:lstStyle/>
           <a:p>
             <a:r>
-              <a:rPr lang="en-US" dirty="0"/>
-              <a:t>5 June 2014</a:t>
+              <a:rPr lang="en-US" dirty="0" smtClean="0"/>
+              <a:t>May 2014</a:t>
             </a:r>
             <a:endParaRPr lang="en-US" dirty="0"/>
           </a:p>
@@ -5287,11 +5299,7 @@
           <a:p>
             <a:r>
               <a:rPr lang="en-US" dirty="0" smtClean="0"/>
-              <a:t>5 June </a:t>
-            </a:r>
-            <a:r>
-              <a:rPr lang="en-US" dirty="0" smtClean="0"/>
-              <a:t>2014</a:t>
+              <a:t>May 2014</a:t>
             </a:r>
             <a:endParaRPr lang="en-US" dirty="0"/>
           </a:p>

</xml_diff>